<commit_message>
added slides for localization
</commit_message>
<xml_diff>
--- a/pluralization-localization/pluralization-practices.pptx
+++ b/pluralization-localization/pluralization-practices.pptx
@@ -5,16 +5,18 @@
     <p:sldMasterId id="2147483648" r:id="rId1"/>
   </p:sldMasterIdLst>
   <p:notesMasterIdLst>
-    <p:notesMasterId r:id="rId6"/>
+    <p:notesMasterId r:id="rId8"/>
   </p:notesMasterIdLst>
   <p:handoutMasterIdLst>
-    <p:handoutMasterId r:id="rId7"/>
+    <p:handoutMasterId r:id="rId9"/>
   </p:handoutMasterIdLst>
   <p:sldIdLst>
     <p:sldId id="258" r:id="rId2"/>
-    <p:sldId id="267" r:id="rId3"/>
-    <p:sldId id="268" r:id="rId4"/>
-    <p:sldId id="260" r:id="rId5"/>
+    <p:sldId id="269" r:id="rId3"/>
+    <p:sldId id="270" r:id="rId4"/>
+    <p:sldId id="267" r:id="rId5"/>
+    <p:sldId id="268" r:id="rId6"/>
+    <p:sldId id="260" r:id="rId7"/>
   </p:sldIdLst>
   <p:sldSz cx="12188825" cy="6858000"/>
   <p:notesSz cx="6858000" cy="9144000"/>
@@ -225,7 +227,7 @@
           <a:p>
             <a:fld id="{C219E60C-4D6A-4E80-86E8-93FC31499BE1}" type="datetimeFigureOut">
               <a:rPr lang="en-US" smtClean="0"/>
-              <a:t>4/17/17</a:t>
+              <a:t>4/21/17</a:t>
             </a:fld>
             <a:endParaRPr lang="en-US"/>
           </a:p>
@@ -390,7 +392,7 @@
           <a:p>
             <a:fld id="{59A5C5F0-898F-42B4-A1C2-93205E2B9589}" type="datetimeFigureOut">
               <a:rPr lang="en-US" smtClean="0"/>
-              <a:t>4/17/17</a:t>
+              <a:t>4/21/17</a:t>
             </a:fld>
             <a:endParaRPr lang="en-US"/>
           </a:p>
@@ -723,7 +725,7 @@
           <a:p>
             <a:fld id="{D0E4A6F0-CDA2-4942-BA52-A648B49E7B5E}" type="slidenum">
               <a:rPr lang="en-US" smtClean="0"/>
-              <a:t>3</a:t>
+              <a:t>5</a:t>
             </a:fld>
             <a:endParaRPr lang="en-US"/>
           </a:p>
@@ -802,14 +804,14 @@
           </a:ln>
           <a:extLst>
             <a:ext uri="{909E8E84-426E-40dd-AFC4-6F175D3DCCD1}">
-              <a14:hiddenFill xmlns:a14="http://schemas.microsoft.com/office/drawing/2010/main" xmlns="">
+              <a14:hiddenFill xmlns="" xmlns:a14="http://schemas.microsoft.com/office/drawing/2010/main">
                 <a:solidFill>
                   <a:srgbClr val="FFFFFF"/>
                 </a:solidFill>
               </a14:hiddenFill>
             </a:ext>
             <a:ext uri="{91240B29-F687-4f45-9708-019B960494DF}">
-              <a14:hiddenLine xmlns:a14="http://schemas.microsoft.com/office/drawing/2010/main" xmlns="" w="9525" cap="flat">
+              <a14:hiddenLine xmlns="" xmlns:a14="http://schemas.microsoft.com/office/drawing/2010/main" w="9525" cap="flat">
                 <a:solidFill>
                   <a:srgbClr val="000000"/>
                 </a:solidFill>
@@ -907,7 +909,7 @@
             </a:ln>
             <a:extLst>
               <a:ext uri="{91240B29-F687-4f45-9708-019B960494DF}">
-                <a14:hiddenLine xmlns:a14="http://schemas.microsoft.com/office/drawing/2010/main" xmlns="" w="25400">
+                <a14:hiddenLine xmlns="" xmlns:a14="http://schemas.microsoft.com/office/drawing/2010/main" w="25400">
                   <a:solidFill>
                     <a:schemeClr val="tx1"/>
                   </a:solidFill>
@@ -965,14 +967,14 @@
             </a:ln>
             <a:extLst>
               <a:ext uri="{909E8E84-426E-40dd-AFC4-6F175D3DCCD1}">
-                <a14:hiddenFill xmlns:a14="http://schemas.microsoft.com/office/drawing/2010/main" xmlns="">
+                <a14:hiddenFill xmlns="" xmlns:a14="http://schemas.microsoft.com/office/drawing/2010/main">
                   <a:solidFill>
                     <a:srgbClr val="FFFFFF"/>
                   </a:solidFill>
                 </a14:hiddenFill>
               </a:ext>
               <a:ext uri="{91240B29-F687-4f45-9708-019B960494DF}">
-                <a14:hiddenLine xmlns:a14="http://schemas.microsoft.com/office/drawing/2010/main" xmlns="" w="9525">
+                <a14:hiddenLine xmlns="" xmlns:a14="http://schemas.microsoft.com/office/drawing/2010/main" w="9525">
                   <a:solidFill>
                     <a:srgbClr val="000000"/>
                   </a:solidFill>
@@ -1247,7 +1249,7 @@
             </a:ln>
             <a:extLst>
               <a:ext uri="{91240B29-F687-4f45-9708-019B960494DF}">
-                <a14:hiddenLine xmlns:a14="http://schemas.microsoft.com/office/drawing/2010/main" xmlns="" w="25400">
+                <a14:hiddenLine xmlns="" xmlns:a14="http://schemas.microsoft.com/office/drawing/2010/main" w="25400">
                   <a:solidFill>
                     <a:schemeClr val="tx1"/>
                   </a:solidFill>
@@ -1305,14 +1307,14 @@
             </a:ln>
             <a:extLst>
               <a:ext uri="{909E8E84-426E-40dd-AFC4-6F175D3DCCD1}">
-                <a14:hiddenFill xmlns:a14="http://schemas.microsoft.com/office/drawing/2010/main" xmlns="">
+                <a14:hiddenFill xmlns="" xmlns:a14="http://schemas.microsoft.com/office/drawing/2010/main">
                   <a:solidFill>
                     <a:srgbClr val="FFFFFF"/>
                   </a:solidFill>
                 </a14:hiddenFill>
               </a:ext>
               <a:ext uri="{91240B29-F687-4f45-9708-019B960494DF}">
-                <a14:hiddenLine xmlns:a14="http://schemas.microsoft.com/office/drawing/2010/main" xmlns="" w="9525">
+                <a14:hiddenLine xmlns="" xmlns:a14="http://schemas.microsoft.com/office/drawing/2010/main" w="9525">
                   <a:solidFill>
                     <a:srgbClr val="000000"/>
                   </a:solidFill>
@@ -1490,7 +1492,7 @@
             </a:ln>
             <a:extLst>
               <a:ext uri="{91240B29-F687-4f45-9708-019B960494DF}">
-                <a14:hiddenLine xmlns:a14="http://schemas.microsoft.com/office/drawing/2010/main" xmlns="" w="25400">
+                <a14:hiddenLine xmlns="" xmlns:a14="http://schemas.microsoft.com/office/drawing/2010/main" w="25400">
                   <a:solidFill>
                     <a:schemeClr val="tx1"/>
                   </a:solidFill>
@@ -1548,14 +1550,14 @@
             </a:ln>
             <a:extLst>
               <a:ext uri="{909E8E84-426E-40dd-AFC4-6F175D3DCCD1}">
-                <a14:hiddenFill xmlns:a14="http://schemas.microsoft.com/office/drawing/2010/main" xmlns="">
+                <a14:hiddenFill xmlns="" xmlns:a14="http://schemas.microsoft.com/office/drawing/2010/main">
                   <a:solidFill>
                     <a:srgbClr val="FFFFFF"/>
                   </a:solidFill>
                 </a14:hiddenFill>
               </a:ext>
               <a:ext uri="{91240B29-F687-4f45-9708-019B960494DF}">
-                <a14:hiddenLine xmlns:a14="http://schemas.microsoft.com/office/drawing/2010/main" xmlns="" w="9525">
+                <a14:hiddenLine xmlns="" xmlns:a14="http://schemas.microsoft.com/office/drawing/2010/main" w="9525">
                   <a:solidFill>
                     <a:srgbClr val="000000"/>
                   </a:solidFill>
@@ -1763,7 +1765,7 @@
             </a:ln>
             <a:extLst>
               <a:ext uri="{91240B29-F687-4f45-9708-019B960494DF}">
-                <a14:hiddenLine xmlns:a14="http://schemas.microsoft.com/office/drawing/2010/main" xmlns="" w="25400">
+                <a14:hiddenLine xmlns="" xmlns:a14="http://schemas.microsoft.com/office/drawing/2010/main" w="25400">
                   <a:solidFill>
                     <a:schemeClr val="tx1"/>
                   </a:solidFill>
@@ -1821,14 +1823,14 @@
             </a:ln>
             <a:extLst>
               <a:ext uri="{909E8E84-426E-40dd-AFC4-6F175D3DCCD1}">
-                <a14:hiddenFill xmlns:a14="http://schemas.microsoft.com/office/drawing/2010/main" xmlns="">
+                <a14:hiddenFill xmlns="" xmlns:a14="http://schemas.microsoft.com/office/drawing/2010/main">
                   <a:solidFill>
                     <a:srgbClr val="FFFFFF"/>
                   </a:solidFill>
                 </a14:hiddenFill>
               </a:ext>
               <a:ext uri="{91240B29-F687-4f45-9708-019B960494DF}">
-                <a14:hiddenLine xmlns:a14="http://schemas.microsoft.com/office/drawing/2010/main" xmlns="" w="9525">
+                <a14:hiddenLine xmlns="" xmlns:a14="http://schemas.microsoft.com/office/drawing/2010/main" w="9525">
                   <a:solidFill>
                     <a:srgbClr val="000000"/>
                   </a:solidFill>
@@ -1972,7 +1974,7 @@
             </a:ln>
             <a:extLst>
               <a:ext uri="{91240B29-F687-4f45-9708-019B960494DF}">
-                <a14:hiddenLine xmlns:a14="http://schemas.microsoft.com/office/drawing/2010/main" xmlns="" w="25400">
+                <a14:hiddenLine xmlns="" xmlns:a14="http://schemas.microsoft.com/office/drawing/2010/main" w="25400">
                   <a:solidFill>
                     <a:schemeClr val="tx1"/>
                   </a:solidFill>
@@ -2030,14 +2032,14 @@
             </a:ln>
             <a:extLst>
               <a:ext uri="{909E8E84-426E-40dd-AFC4-6F175D3DCCD1}">
-                <a14:hiddenFill xmlns:a14="http://schemas.microsoft.com/office/drawing/2010/main" xmlns="">
+                <a14:hiddenFill xmlns="" xmlns:a14="http://schemas.microsoft.com/office/drawing/2010/main">
                   <a:solidFill>
                     <a:srgbClr val="FFFFFF"/>
                   </a:solidFill>
                 </a14:hiddenFill>
               </a:ext>
               <a:ext uri="{91240B29-F687-4f45-9708-019B960494DF}">
-                <a14:hiddenLine xmlns:a14="http://schemas.microsoft.com/office/drawing/2010/main" xmlns="" w="9525">
+                <a14:hiddenLine xmlns="" xmlns:a14="http://schemas.microsoft.com/office/drawing/2010/main" w="9525">
                   <a:solidFill>
                     <a:srgbClr val="000000"/>
                   </a:solidFill>
@@ -2212,7 +2214,7 @@
             </a:ln>
             <a:extLst>
               <a:ext uri="{91240B29-F687-4f45-9708-019B960494DF}">
-                <a14:hiddenLine xmlns:a14="http://schemas.microsoft.com/office/drawing/2010/main" xmlns="" w="25400">
+                <a14:hiddenLine xmlns="" xmlns:a14="http://schemas.microsoft.com/office/drawing/2010/main" w="25400">
                   <a:solidFill>
                     <a:schemeClr val="tx1"/>
                   </a:solidFill>
@@ -2270,14 +2272,14 @@
             </a:ln>
             <a:extLst>
               <a:ext uri="{909E8E84-426E-40dd-AFC4-6F175D3DCCD1}">
-                <a14:hiddenFill xmlns:a14="http://schemas.microsoft.com/office/drawing/2010/main" xmlns="">
+                <a14:hiddenFill xmlns="" xmlns:a14="http://schemas.microsoft.com/office/drawing/2010/main">
                   <a:solidFill>
                     <a:srgbClr val="FFFFFF"/>
                   </a:solidFill>
                 </a14:hiddenFill>
               </a:ext>
               <a:ext uri="{91240B29-F687-4f45-9708-019B960494DF}">
-                <a14:hiddenLine xmlns:a14="http://schemas.microsoft.com/office/drawing/2010/main" xmlns="" w="9525">
+                <a14:hiddenLine xmlns="" xmlns:a14="http://schemas.microsoft.com/office/drawing/2010/main" w="9525">
                   <a:solidFill>
                     <a:srgbClr val="000000"/>
                   </a:solidFill>
@@ -2581,7 +2583,7 @@
             </a:ln>
             <a:extLst>
               <a:ext uri="{91240B29-F687-4f45-9708-019B960494DF}">
-                <a14:hiddenLine xmlns:a14="http://schemas.microsoft.com/office/drawing/2010/main" xmlns="" w="25400">
+                <a14:hiddenLine xmlns="" xmlns:a14="http://schemas.microsoft.com/office/drawing/2010/main" w="25400">
                   <a:solidFill>
                     <a:schemeClr val="tx1"/>
                   </a:solidFill>
@@ -2639,14 +2641,14 @@
             </a:ln>
             <a:extLst>
               <a:ext uri="{909E8E84-426E-40dd-AFC4-6F175D3DCCD1}">
-                <a14:hiddenFill xmlns:a14="http://schemas.microsoft.com/office/drawing/2010/main" xmlns="">
+                <a14:hiddenFill xmlns="" xmlns:a14="http://schemas.microsoft.com/office/drawing/2010/main">
                   <a:solidFill>
                     <a:srgbClr val="FFFFFF"/>
                   </a:solidFill>
                 </a14:hiddenFill>
               </a:ext>
               <a:ext uri="{91240B29-F687-4f45-9708-019B960494DF}">
-                <a14:hiddenLine xmlns:a14="http://schemas.microsoft.com/office/drawing/2010/main" xmlns="" w="9525">
+                <a14:hiddenLine xmlns="" xmlns:a14="http://schemas.microsoft.com/office/drawing/2010/main" w="9525">
                   <a:solidFill>
                     <a:srgbClr val="000000"/>
                   </a:solidFill>
@@ -2832,7 +2834,7 @@
             </a:ln>
             <a:extLst>
               <a:ext uri="{91240B29-F687-4f45-9708-019B960494DF}">
-                <a14:hiddenLine xmlns:a14="http://schemas.microsoft.com/office/drawing/2010/main" xmlns="" w="25400">
+                <a14:hiddenLine xmlns="" xmlns:a14="http://schemas.microsoft.com/office/drawing/2010/main" w="25400">
                   <a:solidFill>
                     <a:schemeClr val="tx1"/>
                   </a:solidFill>
@@ -2890,14 +2892,14 @@
             </a:ln>
             <a:extLst>
               <a:ext uri="{909E8E84-426E-40dd-AFC4-6F175D3DCCD1}">
-                <a14:hiddenFill xmlns:a14="http://schemas.microsoft.com/office/drawing/2010/main" xmlns="">
+                <a14:hiddenFill xmlns="" xmlns:a14="http://schemas.microsoft.com/office/drawing/2010/main">
                   <a:solidFill>
                     <a:srgbClr val="FFFFFF"/>
                   </a:solidFill>
                 </a14:hiddenFill>
               </a:ext>
               <a:ext uri="{91240B29-F687-4f45-9708-019B960494DF}">
-                <a14:hiddenLine xmlns:a14="http://schemas.microsoft.com/office/drawing/2010/main" xmlns="" w="9525">
+                <a14:hiddenLine xmlns="" xmlns:a14="http://schemas.microsoft.com/office/drawing/2010/main" w="9525">
                   <a:solidFill>
                     <a:srgbClr val="000000"/>
                   </a:solidFill>
@@ -3004,7 +3006,7 @@
             </a:ln>
             <a:extLst>
               <a:ext uri="{91240B29-F687-4f45-9708-019B960494DF}">
-                <a14:hiddenLine xmlns:a14="http://schemas.microsoft.com/office/drawing/2010/main" xmlns="" w="25400">
+                <a14:hiddenLine xmlns="" xmlns:a14="http://schemas.microsoft.com/office/drawing/2010/main" w="25400">
                   <a:solidFill>
                     <a:schemeClr val="tx1"/>
                   </a:solidFill>
@@ -3062,14 +3064,14 @@
             </a:ln>
             <a:extLst>
               <a:ext uri="{909E8E84-426E-40dd-AFC4-6F175D3DCCD1}">
-                <a14:hiddenFill xmlns:a14="http://schemas.microsoft.com/office/drawing/2010/main" xmlns="">
+                <a14:hiddenFill xmlns="" xmlns:a14="http://schemas.microsoft.com/office/drawing/2010/main">
                   <a:solidFill>
                     <a:srgbClr val="FFFFFF"/>
                   </a:solidFill>
                 </a14:hiddenFill>
               </a:ext>
               <a:ext uri="{91240B29-F687-4f45-9708-019B960494DF}">
-                <a14:hiddenLine xmlns:a14="http://schemas.microsoft.com/office/drawing/2010/main" xmlns="" w="9525">
+                <a14:hiddenLine xmlns="" xmlns:a14="http://schemas.microsoft.com/office/drawing/2010/main" w="9525">
                   <a:solidFill>
                     <a:srgbClr val="000000"/>
                   </a:solidFill>
@@ -3320,7 +3322,7 @@
             </a:ln>
             <a:extLst>
               <a:ext uri="{91240B29-F687-4f45-9708-019B960494DF}">
-                <a14:hiddenLine xmlns:a14="http://schemas.microsoft.com/office/drawing/2010/main" xmlns="" w="25400">
+                <a14:hiddenLine xmlns="" xmlns:a14="http://schemas.microsoft.com/office/drawing/2010/main" w="25400">
                   <a:solidFill>
                     <a:schemeClr val="tx1"/>
                   </a:solidFill>
@@ -3378,14 +3380,14 @@
             </a:ln>
             <a:extLst>
               <a:ext uri="{909E8E84-426E-40dd-AFC4-6F175D3DCCD1}">
-                <a14:hiddenFill xmlns:a14="http://schemas.microsoft.com/office/drawing/2010/main" xmlns="">
+                <a14:hiddenFill xmlns="" xmlns:a14="http://schemas.microsoft.com/office/drawing/2010/main">
                   <a:solidFill>
                     <a:srgbClr val="FFFFFF"/>
                   </a:solidFill>
                 </a14:hiddenFill>
               </a:ext>
               <a:ext uri="{91240B29-F687-4f45-9708-019B960494DF}">
-                <a14:hiddenLine xmlns:a14="http://schemas.microsoft.com/office/drawing/2010/main" xmlns="" w="9525">
+                <a14:hiddenLine xmlns="" xmlns:a14="http://schemas.microsoft.com/office/drawing/2010/main" w="9525">
                   <a:solidFill>
                     <a:srgbClr val="000000"/>
                   </a:solidFill>
@@ -3560,14 +3562,14 @@
           </a:ln>
           <a:extLst>
             <a:ext uri="{909E8E84-426E-40dd-AFC4-6F175D3DCCD1}">
-              <a14:hiddenFill xmlns:a14="http://schemas.microsoft.com/office/drawing/2010/main" xmlns="">
+              <a14:hiddenFill xmlns="" xmlns:a14="http://schemas.microsoft.com/office/drawing/2010/main">
                 <a:solidFill>
                   <a:srgbClr val="FFFFFF"/>
                 </a:solidFill>
               </a14:hiddenFill>
             </a:ext>
             <a:ext uri="{91240B29-F687-4f45-9708-019B960494DF}">
-              <a14:hiddenLine xmlns:a14="http://schemas.microsoft.com/office/drawing/2010/main" xmlns="" w="9525" cap="flat">
+              <a14:hiddenLine xmlns="" xmlns:a14="http://schemas.microsoft.com/office/drawing/2010/main" w="9525" cap="flat">
                 <a:solidFill>
                   <a:schemeClr val="tx1"/>
                 </a:solidFill>
@@ -3673,7 +3675,7 @@
             </a:ln>
             <a:extLst>
               <a:ext uri="{91240B29-F687-4f45-9708-019B960494DF}">
-                <a14:hiddenLine xmlns:a14="http://schemas.microsoft.com/office/drawing/2010/main" xmlns="" w="25400">
+                <a14:hiddenLine xmlns="" xmlns:a14="http://schemas.microsoft.com/office/drawing/2010/main" w="25400">
                   <a:solidFill>
                     <a:schemeClr val="tx1"/>
                   </a:solidFill>
@@ -3731,14 +3733,14 @@
             </a:ln>
             <a:extLst>
               <a:ext uri="{909E8E84-426E-40dd-AFC4-6F175D3DCCD1}">
-                <a14:hiddenFill xmlns:a14="http://schemas.microsoft.com/office/drawing/2010/main" xmlns="">
+                <a14:hiddenFill xmlns="" xmlns:a14="http://schemas.microsoft.com/office/drawing/2010/main">
                   <a:solidFill>
                     <a:srgbClr val="FFFFFF"/>
                   </a:solidFill>
                 </a14:hiddenFill>
               </a:ext>
               <a:ext uri="{91240B29-F687-4f45-9708-019B960494DF}">
-                <a14:hiddenLine xmlns:a14="http://schemas.microsoft.com/office/drawing/2010/main" xmlns="" w="9525">
+                <a14:hiddenLine xmlns="" xmlns:a14="http://schemas.microsoft.com/office/drawing/2010/main" w="9525">
                   <a:solidFill>
                     <a:srgbClr val="000000"/>
                   </a:solidFill>
@@ -4045,7 +4047,7 @@
             </a:ln>
             <a:extLst>
               <a:ext uri="{91240B29-F687-4f45-9708-019B960494DF}">
-                <a14:hiddenLine xmlns:a14="http://schemas.microsoft.com/office/drawing/2010/main" xmlns="" w="25400">
+                <a14:hiddenLine xmlns="" xmlns:a14="http://schemas.microsoft.com/office/drawing/2010/main" w="25400">
                   <a:solidFill>
                     <a:schemeClr val="tx1"/>
                   </a:solidFill>
@@ -4103,14 +4105,14 @@
             </a:ln>
             <a:extLst>
               <a:ext uri="{909E8E84-426E-40dd-AFC4-6F175D3DCCD1}">
-                <a14:hiddenFill xmlns:a14="http://schemas.microsoft.com/office/drawing/2010/main" xmlns="">
+                <a14:hiddenFill xmlns="" xmlns:a14="http://schemas.microsoft.com/office/drawing/2010/main">
                   <a:solidFill>
                     <a:srgbClr val="FFFFFF"/>
                   </a:solidFill>
                 </a14:hiddenFill>
               </a:ext>
               <a:ext uri="{91240B29-F687-4f45-9708-019B960494DF}">
-                <a14:hiddenLine xmlns:a14="http://schemas.microsoft.com/office/drawing/2010/main" xmlns="" w="9525">
+                <a14:hiddenLine xmlns="" xmlns:a14="http://schemas.microsoft.com/office/drawing/2010/main" w="9525">
                   <a:solidFill>
                     <a:srgbClr val="000000"/>
                   </a:solidFill>
@@ -4299,7 +4301,7 @@
             </a:ln>
             <a:extLst>
               <a:ext uri="{91240B29-F687-4f45-9708-019B960494DF}">
-                <a14:hiddenLine xmlns:a14="http://schemas.microsoft.com/office/drawing/2010/main" xmlns="" w="25400">
+                <a14:hiddenLine xmlns="" xmlns:a14="http://schemas.microsoft.com/office/drawing/2010/main" w="25400">
                   <a:solidFill>
                     <a:schemeClr val="tx1"/>
                   </a:solidFill>
@@ -4357,14 +4359,14 @@
             </a:ln>
             <a:extLst>
               <a:ext uri="{909E8E84-426E-40dd-AFC4-6F175D3DCCD1}">
-                <a14:hiddenFill xmlns:a14="http://schemas.microsoft.com/office/drawing/2010/main" xmlns="">
+                <a14:hiddenFill xmlns="" xmlns:a14="http://schemas.microsoft.com/office/drawing/2010/main">
                   <a:solidFill>
                     <a:srgbClr val="FFFFFF"/>
                   </a:solidFill>
                 </a14:hiddenFill>
               </a:ext>
               <a:ext uri="{91240B29-F687-4f45-9708-019B960494DF}">
-                <a14:hiddenLine xmlns:a14="http://schemas.microsoft.com/office/drawing/2010/main" xmlns="" w="9525">
+                <a14:hiddenLine xmlns="" xmlns:a14="http://schemas.microsoft.com/office/drawing/2010/main" w="9525">
                   <a:solidFill>
                     <a:srgbClr val="000000"/>
                   </a:solidFill>
@@ -4471,7 +4473,7 @@
             </a:ln>
             <a:extLst>
               <a:ext uri="{91240B29-F687-4f45-9708-019B960494DF}">
-                <a14:hiddenLine xmlns:a14="http://schemas.microsoft.com/office/drawing/2010/main" xmlns="" w="25400">
+                <a14:hiddenLine xmlns="" xmlns:a14="http://schemas.microsoft.com/office/drawing/2010/main" w="25400">
                   <a:solidFill>
                     <a:schemeClr val="tx1"/>
                   </a:solidFill>
@@ -4529,14 +4531,14 @@
             </a:ln>
             <a:extLst>
               <a:ext uri="{909E8E84-426E-40dd-AFC4-6F175D3DCCD1}">
-                <a14:hiddenFill xmlns:a14="http://schemas.microsoft.com/office/drawing/2010/main" xmlns="">
+                <a14:hiddenFill xmlns="" xmlns:a14="http://schemas.microsoft.com/office/drawing/2010/main">
                   <a:solidFill>
                     <a:srgbClr val="FFFFFF"/>
                   </a:solidFill>
                 </a14:hiddenFill>
               </a:ext>
               <a:ext uri="{91240B29-F687-4f45-9708-019B960494DF}">
-                <a14:hiddenLine xmlns:a14="http://schemas.microsoft.com/office/drawing/2010/main" xmlns="" w="9525">
+                <a14:hiddenLine xmlns="" xmlns:a14="http://schemas.microsoft.com/office/drawing/2010/main" w="9525">
                   <a:solidFill>
                     <a:srgbClr val="000000"/>
                   </a:solidFill>
@@ -4787,7 +4789,7 @@
             </a:ln>
             <a:extLst>
               <a:ext uri="{91240B29-F687-4f45-9708-019B960494DF}">
-                <a14:hiddenLine xmlns:a14="http://schemas.microsoft.com/office/drawing/2010/main" xmlns="" w="25400">
+                <a14:hiddenLine xmlns="" xmlns:a14="http://schemas.microsoft.com/office/drawing/2010/main" w="25400">
                   <a:solidFill>
                     <a:schemeClr val="tx1"/>
                   </a:solidFill>
@@ -4845,14 +4847,14 @@
             </a:ln>
             <a:extLst>
               <a:ext uri="{909E8E84-426E-40dd-AFC4-6F175D3DCCD1}">
-                <a14:hiddenFill xmlns:a14="http://schemas.microsoft.com/office/drawing/2010/main" xmlns="">
+                <a14:hiddenFill xmlns="" xmlns:a14="http://schemas.microsoft.com/office/drawing/2010/main">
                   <a:solidFill>
                     <a:srgbClr val="FFFFFF"/>
                   </a:solidFill>
                 </a14:hiddenFill>
               </a:ext>
               <a:ext uri="{91240B29-F687-4f45-9708-019B960494DF}">
-                <a14:hiddenLine xmlns:a14="http://schemas.microsoft.com/office/drawing/2010/main" xmlns="" w="9525">
+                <a14:hiddenLine xmlns="" xmlns:a14="http://schemas.microsoft.com/office/drawing/2010/main" w="9525">
                   <a:solidFill>
                     <a:srgbClr val="000000"/>
                   </a:solidFill>
@@ -5030,7 +5032,7 @@
             </a:ln>
             <a:extLst>
               <a:ext uri="{91240B29-F687-4f45-9708-019B960494DF}">
-                <a14:hiddenLine xmlns:a14="http://schemas.microsoft.com/office/drawing/2010/main" xmlns="" w="25400">
+                <a14:hiddenLine xmlns="" xmlns:a14="http://schemas.microsoft.com/office/drawing/2010/main" w="25400">
                   <a:solidFill>
                     <a:schemeClr val="tx1"/>
                   </a:solidFill>
@@ -5088,14 +5090,14 @@
             </a:ln>
             <a:extLst>
               <a:ext uri="{909E8E84-426E-40dd-AFC4-6F175D3DCCD1}">
-                <a14:hiddenFill xmlns:a14="http://schemas.microsoft.com/office/drawing/2010/main" xmlns="">
+                <a14:hiddenFill xmlns="" xmlns:a14="http://schemas.microsoft.com/office/drawing/2010/main">
                   <a:solidFill>
                     <a:srgbClr val="FFFFFF"/>
                   </a:solidFill>
                 </a14:hiddenFill>
               </a:ext>
               <a:ext uri="{91240B29-F687-4f45-9708-019B960494DF}">
-                <a14:hiddenLine xmlns:a14="http://schemas.microsoft.com/office/drawing/2010/main" xmlns="" w="9525">
+                <a14:hiddenLine xmlns="" xmlns:a14="http://schemas.microsoft.com/office/drawing/2010/main" w="9525">
                   <a:solidFill>
                     <a:srgbClr val="000000"/>
                   </a:solidFill>
@@ -5402,7 +5404,7 @@
             </a:ln>
             <a:extLst>
               <a:ext uri="{91240B29-F687-4f45-9708-019B960494DF}">
-                <a14:hiddenLine xmlns:a14="http://schemas.microsoft.com/office/drawing/2010/main" xmlns="" w="25400">
+                <a14:hiddenLine xmlns="" xmlns:a14="http://schemas.microsoft.com/office/drawing/2010/main" w="25400">
                   <a:solidFill>
                     <a:schemeClr val="tx1"/>
                   </a:solidFill>
@@ -5460,14 +5462,14 @@
             </a:ln>
             <a:extLst>
               <a:ext uri="{909E8E84-426E-40dd-AFC4-6F175D3DCCD1}">
-                <a14:hiddenFill xmlns:a14="http://schemas.microsoft.com/office/drawing/2010/main" xmlns="">
+                <a14:hiddenFill xmlns="" xmlns:a14="http://schemas.microsoft.com/office/drawing/2010/main">
                   <a:solidFill>
                     <a:srgbClr val="FFFFFF"/>
                   </a:solidFill>
                 </a14:hiddenFill>
               </a:ext>
               <a:ext uri="{91240B29-F687-4f45-9708-019B960494DF}">
-                <a14:hiddenLine xmlns:a14="http://schemas.microsoft.com/office/drawing/2010/main" xmlns="" w="9525">
+                <a14:hiddenLine xmlns="" xmlns:a14="http://schemas.microsoft.com/office/drawing/2010/main" w="9525">
                   <a:solidFill>
                     <a:srgbClr val="000000"/>
                   </a:solidFill>
@@ -5656,7 +5658,7 @@
             </a:ln>
             <a:extLst>
               <a:ext uri="{91240B29-F687-4f45-9708-019B960494DF}">
-                <a14:hiddenLine xmlns:a14="http://schemas.microsoft.com/office/drawing/2010/main" xmlns="" w="25400">
+                <a14:hiddenLine xmlns="" xmlns:a14="http://schemas.microsoft.com/office/drawing/2010/main" w="25400">
                   <a:solidFill>
                     <a:schemeClr val="tx1"/>
                   </a:solidFill>
@@ -5714,14 +5716,14 @@
             </a:ln>
             <a:extLst>
               <a:ext uri="{909E8E84-426E-40dd-AFC4-6F175D3DCCD1}">
-                <a14:hiddenFill xmlns:a14="http://schemas.microsoft.com/office/drawing/2010/main" xmlns="">
+                <a14:hiddenFill xmlns="" xmlns:a14="http://schemas.microsoft.com/office/drawing/2010/main">
                   <a:solidFill>
                     <a:srgbClr val="FFFFFF"/>
                   </a:solidFill>
                 </a14:hiddenFill>
               </a:ext>
               <a:ext uri="{91240B29-F687-4f45-9708-019B960494DF}">
-                <a14:hiddenLine xmlns:a14="http://schemas.microsoft.com/office/drawing/2010/main" xmlns="" w="9525">
+                <a14:hiddenLine xmlns="" xmlns:a14="http://schemas.microsoft.com/office/drawing/2010/main" w="9525">
                   <a:solidFill>
                     <a:srgbClr val="000000"/>
                   </a:solidFill>
@@ -5828,7 +5830,7 @@
             </a:ln>
             <a:extLst>
               <a:ext uri="{91240B29-F687-4f45-9708-019B960494DF}">
-                <a14:hiddenLine xmlns:a14="http://schemas.microsoft.com/office/drawing/2010/main" xmlns="" w="25400">
+                <a14:hiddenLine xmlns="" xmlns:a14="http://schemas.microsoft.com/office/drawing/2010/main" w="25400">
                   <a:solidFill>
                     <a:schemeClr val="tx1"/>
                   </a:solidFill>
@@ -5886,14 +5888,14 @@
             </a:ln>
             <a:extLst>
               <a:ext uri="{909E8E84-426E-40dd-AFC4-6F175D3DCCD1}">
-                <a14:hiddenFill xmlns:a14="http://schemas.microsoft.com/office/drawing/2010/main" xmlns="">
+                <a14:hiddenFill xmlns="" xmlns:a14="http://schemas.microsoft.com/office/drawing/2010/main">
                   <a:solidFill>
                     <a:srgbClr val="FFFFFF"/>
                   </a:solidFill>
                 </a14:hiddenFill>
               </a:ext>
               <a:ext uri="{91240B29-F687-4f45-9708-019B960494DF}">
-                <a14:hiddenLine xmlns:a14="http://schemas.microsoft.com/office/drawing/2010/main" xmlns="" w="9525">
+                <a14:hiddenLine xmlns="" xmlns:a14="http://schemas.microsoft.com/office/drawing/2010/main" w="9525">
                   <a:solidFill>
                     <a:srgbClr val="000000"/>
                   </a:solidFill>
@@ -6144,7 +6146,7 @@
             </a:ln>
             <a:extLst>
               <a:ext uri="{91240B29-F687-4f45-9708-019B960494DF}">
-                <a14:hiddenLine xmlns:a14="http://schemas.microsoft.com/office/drawing/2010/main" xmlns="" w="25400">
+                <a14:hiddenLine xmlns="" xmlns:a14="http://schemas.microsoft.com/office/drawing/2010/main" w="25400">
                   <a:solidFill>
                     <a:schemeClr val="tx1"/>
                   </a:solidFill>
@@ -6202,14 +6204,14 @@
             </a:ln>
             <a:extLst>
               <a:ext uri="{909E8E84-426E-40dd-AFC4-6F175D3DCCD1}">
-                <a14:hiddenFill xmlns:a14="http://schemas.microsoft.com/office/drawing/2010/main" xmlns="">
+                <a14:hiddenFill xmlns="" xmlns:a14="http://schemas.microsoft.com/office/drawing/2010/main">
                   <a:solidFill>
                     <a:srgbClr val="FFFFFF"/>
                   </a:solidFill>
                 </a14:hiddenFill>
               </a:ext>
               <a:ext uri="{91240B29-F687-4f45-9708-019B960494DF}">
-                <a14:hiddenLine xmlns:a14="http://schemas.microsoft.com/office/drawing/2010/main" xmlns="" w="9525">
+                <a14:hiddenLine xmlns="" xmlns:a14="http://schemas.microsoft.com/office/drawing/2010/main" w="9525">
                   <a:solidFill>
                     <a:srgbClr val="000000"/>
                   </a:solidFill>
@@ -6373,7 +6375,7 @@
           </a:ln>
           <a:extLst>
             <a:ext uri="{91240B29-F687-4f45-9708-019B960494DF}">
-              <a14:hiddenLine xmlns:a14="http://schemas.microsoft.com/office/drawing/2010/main" xmlns="" w="9525">
+              <a14:hiddenLine xmlns="" xmlns:a14="http://schemas.microsoft.com/office/drawing/2010/main" w="9525">
                 <a:solidFill>
                   <a:srgbClr val="000000"/>
                 </a:solidFill>
@@ -6431,14 +6433,14 @@
           </a:ln>
           <a:extLst>
             <a:ext uri="{909E8E84-426E-40dd-AFC4-6F175D3DCCD1}">
-              <a14:hiddenFill xmlns:a14="http://schemas.microsoft.com/office/drawing/2010/main" xmlns="">
+              <a14:hiddenFill xmlns="" xmlns:a14="http://schemas.microsoft.com/office/drawing/2010/main">
                 <a:solidFill>
                   <a:srgbClr val="FFFFFF"/>
                 </a:solidFill>
               </a14:hiddenFill>
             </a:ext>
             <a:ext uri="{91240B29-F687-4f45-9708-019B960494DF}">
-              <a14:hiddenLine xmlns:a14="http://schemas.microsoft.com/office/drawing/2010/main" xmlns="" w="9525" cap="flat">
+              <a14:hiddenLine xmlns="" xmlns:a14="http://schemas.microsoft.com/office/drawing/2010/main" w="9525" cap="flat">
                 <a:solidFill>
                   <a:srgbClr val="000000"/>
                 </a:solidFill>
@@ -6544,7 +6546,7 @@
             </a:ln>
             <a:extLst>
               <a:ext uri="{91240B29-F687-4f45-9708-019B960494DF}">
-                <a14:hiddenLine xmlns:a14="http://schemas.microsoft.com/office/drawing/2010/main" xmlns="" w="25400">
+                <a14:hiddenLine xmlns="" xmlns:a14="http://schemas.microsoft.com/office/drawing/2010/main" w="25400">
                   <a:solidFill>
                     <a:schemeClr val="tx1"/>
                   </a:solidFill>
@@ -6602,14 +6604,14 @@
             </a:ln>
             <a:extLst>
               <a:ext uri="{909E8E84-426E-40dd-AFC4-6F175D3DCCD1}">
-                <a14:hiddenFill xmlns:a14="http://schemas.microsoft.com/office/drawing/2010/main" xmlns="">
+                <a14:hiddenFill xmlns="" xmlns:a14="http://schemas.microsoft.com/office/drawing/2010/main">
                   <a:solidFill>
                     <a:srgbClr val="FFFFFF"/>
                   </a:solidFill>
                 </a14:hiddenFill>
               </a:ext>
               <a:ext uri="{91240B29-F687-4f45-9708-019B960494DF}">
-                <a14:hiddenLine xmlns:a14="http://schemas.microsoft.com/office/drawing/2010/main" xmlns="" w="9525">
+                <a14:hiddenLine xmlns="" xmlns:a14="http://schemas.microsoft.com/office/drawing/2010/main" w="9525">
                   <a:solidFill>
                     <a:srgbClr val="000000"/>
                   </a:solidFill>
@@ -6916,7 +6918,7 @@
             </a:ln>
             <a:extLst>
               <a:ext uri="{91240B29-F687-4f45-9708-019B960494DF}">
-                <a14:hiddenLine xmlns:a14="http://schemas.microsoft.com/office/drawing/2010/main" xmlns="" w="25400">
+                <a14:hiddenLine xmlns="" xmlns:a14="http://schemas.microsoft.com/office/drawing/2010/main" w="25400">
                   <a:solidFill>
                     <a:schemeClr val="tx1"/>
                   </a:solidFill>
@@ -6974,14 +6976,14 @@
             </a:ln>
             <a:extLst>
               <a:ext uri="{909E8E84-426E-40dd-AFC4-6F175D3DCCD1}">
-                <a14:hiddenFill xmlns:a14="http://schemas.microsoft.com/office/drawing/2010/main" xmlns="">
+                <a14:hiddenFill xmlns="" xmlns:a14="http://schemas.microsoft.com/office/drawing/2010/main">
                   <a:solidFill>
                     <a:srgbClr val="FFFFFF"/>
                   </a:solidFill>
                 </a14:hiddenFill>
               </a:ext>
               <a:ext uri="{91240B29-F687-4f45-9708-019B960494DF}">
-                <a14:hiddenLine xmlns:a14="http://schemas.microsoft.com/office/drawing/2010/main" xmlns="" w="9525">
+                <a14:hiddenLine xmlns="" xmlns:a14="http://schemas.microsoft.com/office/drawing/2010/main" w="9525">
                   <a:solidFill>
                     <a:srgbClr val="000000"/>
                   </a:solidFill>
@@ -7170,7 +7172,7 @@
             </a:ln>
             <a:extLst>
               <a:ext uri="{91240B29-F687-4f45-9708-019B960494DF}">
-                <a14:hiddenLine xmlns:a14="http://schemas.microsoft.com/office/drawing/2010/main" xmlns="" w="25400">
+                <a14:hiddenLine xmlns="" xmlns:a14="http://schemas.microsoft.com/office/drawing/2010/main" w="25400">
                   <a:solidFill>
                     <a:schemeClr val="tx1"/>
                   </a:solidFill>
@@ -7228,14 +7230,14 @@
             </a:ln>
             <a:extLst>
               <a:ext uri="{909E8E84-426E-40dd-AFC4-6F175D3DCCD1}">
-                <a14:hiddenFill xmlns:a14="http://schemas.microsoft.com/office/drawing/2010/main" xmlns="">
+                <a14:hiddenFill xmlns="" xmlns:a14="http://schemas.microsoft.com/office/drawing/2010/main">
                   <a:solidFill>
                     <a:srgbClr val="FFFFFF"/>
                   </a:solidFill>
                 </a14:hiddenFill>
               </a:ext>
               <a:ext uri="{91240B29-F687-4f45-9708-019B960494DF}">
-                <a14:hiddenLine xmlns:a14="http://schemas.microsoft.com/office/drawing/2010/main" xmlns="" w="9525">
+                <a14:hiddenLine xmlns="" xmlns:a14="http://schemas.microsoft.com/office/drawing/2010/main" w="9525">
                   <a:solidFill>
                     <a:srgbClr val="000000"/>
                   </a:solidFill>
@@ -7342,7 +7344,7 @@
             </a:ln>
             <a:extLst>
               <a:ext uri="{91240B29-F687-4f45-9708-019B960494DF}">
-                <a14:hiddenLine xmlns:a14="http://schemas.microsoft.com/office/drawing/2010/main" xmlns="" w="25400">
+                <a14:hiddenLine xmlns="" xmlns:a14="http://schemas.microsoft.com/office/drawing/2010/main" w="25400">
                   <a:solidFill>
                     <a:schemeClr val="tx1"/>
                   </a:solidFill>
@@ -7400,14 +7402,14 @@
             </a:ln>
             <a:extLst>
               <a:ext uri="{909E8E84-426E-40dd-AFC4-6F175D3DCCD1}">
-                <a14:hiddenFill xmlns:a14="http://schemas.microsoft.com/office/drawing/2010/main" xmlns="">
+                <a14:hiddenFill xmlns="" xmlns:a14="http://schemas.microsoft.com/office/drawing/2010/main">
                   <a:solidFill>
                     <a:srgbClr val="FFFFFF"/>
                   </a:solidFill>
                 </a14:hiddenFill>
               </a:ext>
               <a:ext uri="{91240B29-F687-4f45-9708-019B960494DF}">
-                <a14:hiddenLine xmlns:a14="http://schemas.microsoft.com/office/drawing/2010/main" xmlns="" w="9525">
+                <a14:hiddenLine xmlns="" xmlns:a14="http://schemas.microsoft.com/office/drawing/2010/main" w="9525">
                   <a:solidFill>
                     <a:srgbClr val="000000"/>
                   </a:solidFill>
@@ -7658,7 +7660,7 @@
             </a:ln>
             <a:extLst>
               <a:ext uri="{91240B29-F687-4f45-9708-019B960494DF}">
-                <a14:hiddenLine xmlns:a14="http://schemas.microsoft.com/office/drawing/2010/main" xmlns="" w="25400">
+                <a14:hiddenLine xmlns="" xmlns:a14="http://schemas.microsoft.com/office/drawing/2010/main" w="25400">
                   <a:solidFill>
                     <a:schemeClr val="tx1"/>
                   </a:solidFill>
@@ -7716,14 +7718,14 @@
             </a:ln>
             <a:extLst>
               <a:ext uri="{909E8E84-426E-40dd-AFC4-6F175D3DCCD1}">
-                <a14:hiddenFill xmlns:a14="http://schemas.microsoft.com/office/drawing/2010/main" xmlns="">
+                <a14:hiddenFill xmlns="" xmlns:a14="http://schemas.microsoft.com/office/drawing/2010/main">
                   <a:solidFill>
                     <a:srgbClr val="FFFFFF"/>
                   </a:solidFill>
                 </a14:hiddenFill>
               </a:ext>
               <a:ext uri="{91240B29-F687-4f45-9708-019B960494DF}">
-                <a14:hiddenLine xmlns:a14="http://schemas.microsoft.com/office/drawing/2010/main" xmlns="" w="9525">
+                <a14:hiddenLine xmlns="" xmlns:a14="http://schemas.microsoft.com/office/drawing/2010/main" w="9525">
                   <a:solidFill>
                     <a:srgbClr val="000000"/>
                   </a:solidFill>
@@ -7901,7 +7903,7 @@
             </a:ln>
             <a:extLst>
               <a:ext uri="{91240B29-F687-4f45-9708-019B960494DF}">
-                <a14:hiddenLine xmlns:a14="http://schemas.microsoft.com/office/drawing/2010/main" xmlns="" w="25400">
+                <a14:hiddenLine xmlns="" xmlns:a14="http://schemas.microsoft.com/office/drawing/2010/main" w="25400">
                   <a:solidFill>
                     <a:schemeClr val="tx1"/>
                   </a:solidFill>
@@ -7959,14 +7961,14 @@
             </a:ln>
             <a:extLst>
               <a:ext uri="{909E8E84-426E-40dd-AFC4-6F175D3DCCD1}">
-                <a14:hiddenFill xmlns:a14="http://schemas.microsoft.com/office/drawing/2010/main" xmlns="">
+                <a14:hiddenFill xmlns="" xmlns:a14="http://schemas.microsoft.com/office/drawing/2010/main">
                   <a:solidFill>
                     <a:srgbClr val="FFFFFF"/>
                   </a:solidFill>
                 </a14:hiddenFill>
               </a:ext>
               <a:ext uri="{91240B29-F687-4f45-9708-019B960494DF}">
-                <a14:hiddenLine xmlns:a14="http://schemas.microsoft.com/office/drawing/2010/main" xmlns="" w="9525">
+                <a14:hiddenLine xmlns="" xmlns:a14="http://schemas.microsoft.com/office/drawing/2010/main" w="9525">
                   <a:solidFill>
                     <a:srgbClr val="000000"/>
                   </a:solidFill>
@@ -8273,7 +8275,7 @@
             </a:ln>
             <a:extLst>
               <a:ext uri="{91240B29-F687-4f45-9708-019B960494DF}">
-                <a14:hiddenLine xmlns:a14="http://schemas.microsoft.com/office/drawing/2010/main" xmlns="" w="25400">
+                <a14:hiddenLine xmlns="" xmlns:a14="http://schemas.microsoft.com/office/drawing/2010/main" w="25400">
                   <a:solidFill>
                     <a:schemeClr val="tx1"/>
                   </a:solidFill>
@@ -8331,14 +8333,14 @@
             </a:ln>
             <a:extLst>
               <a:ext uri="{909E8E84-426E-40dd-AFC4-6F175D3DCCD1}">
-                <a14:hiddenFill xmlns:a14="http://schemas.microsoft.com/office/drawing/2010/main" xmlns="">
+                <a14:hiddenFill xmlns="" xmlns:a14="http://schemas.microsoft.com/office/drawing/2010/main">
                   <a:solidFill>
                     <a:srgbClr val="FFFFFF"/>
                   </a:solidFill>
                 </a14:hiddenFill>
               </a:ext>
               <a:ext uri="{91240B29-F687-4f45-9708-019B960494DF}">
-                <a14:hiddenLine xmlns:a14="http://schemas.microsoft.com/office/drawing/2010/main" xmlns="" w="9525">
+                <a14:hiddenLine xmlns="" xmlns:a14="http://schemas.microsoft.com/office/drawing/2010/main" w="9525">
                   <a:solidFill>
                     <a:srgbClr val="000000"/>
                   </a:solidFill>
@@ -8527,7 +8529,7 @@
             </a:ln>
             <a:extLst>
               <a:ext uri="{91240B29-F687-4f45-9708-019B960494DF}">
-                <a14:hiddenLine xmlns:a14="http://schemas.microsoft.com/office/drawing/2010/main" xmlns="" w="25400">
+                <a14:hiddenLine xmlns="" xmlns:a14="http://schemas.microsoft.com/office/drawing/2010/main" w="25400">
                   <a:solidFill>
                     <a:schemeClr val="tx1"/>
                   </a:solidFill>
@@ -8585,14 +8587,14 @@
             </a:ln>
             <a:extLst>
               <a:ext uri="{909E8E84-426E-40dd-AFC4-6F175D3DCCD1}">
-                <a14:hiddenFill xmlns:a14="http://schemas.microsoft.com/office/drawing/2010/main" xmlns="">
+                <a14:hiddenFill xmlns="" xmlns:a14="http://schemas.microsoft.com/office/drawing/2010/main">
                   <a:solidFill>
                     <a:srgbClr val="FFFFFF"/>
                   </a:solidFill>
                 </a14:hiddenFill>
               </a:ext>
               <a:ext uri="{91240B29-F687-4f45-9708-019B960494DF}">
-                <a14:hiddenLine xmlns:a14="http://schemas.microsoft.com/office/drawing/2010/main" xmlns="" w="9525">
+                <a14:hiddenLine xmlns="" xmlns:a14="http://schemas.microsoft.com/office/drawing/2010/main" w="9525">
                   <a:solidFill>
                     <a:srgbClr val="000000"/>
                   </a:solidFill>
@@ -8685,7 +8687,7 @@
           </a:ln>
           <a:extLst>
             <a:ext uri="{91240B29-F687-4f45-9708-019B960494DF}">
-              <a14:hiddenLine xmlns:a14="http://schemas.microsoft.com/office/drawing/2010/main" xmlns="" w="9525">
+              <a14:hiddenLine xmlns="" xmlns:a14="http://schemas.microsoft.com/office/drawing/2010/main" w="9525">
                 <a:solidFill>
                   <a:srgbClr val="000000"/>
                 </a:solidFill>
@@ -8743,14 +8745,14 @@
           </a:ln>
           <a:extLst>
             <a:ext uri="{909E8E84-426E-40dd-AFC4-6F175D3DCCD1}">
-              <a14:hiddenFill xmlns:a14="http://schemas.microsoft.com/office/drawing/2010/main" xmlns="">
+              <a14:hiddenFill xmlns="" xmlns:a14="http://schemas.microsoft.com/office/drawing/2010/main">
                 <a:solidFill>
                   <a:srgbClr val="FFFFFF"/>
                 </a:solidFill>
               </a14:hiddenFill>
             </a:ext>
             <a:ext uri="{91240B29-F687-4f45-9708-019B960494DF}">
-              <a14:hiddenLine xmlns:a14="http://schemas.microsoft.com/office/drawing/2010/main" xmlns="" w="9525" cap="flat">
+              <a14:hiddenLine xmlns="" xmlns:a14="http://schemas.microsoft.com/office/drawing/2010/main" w="9525" cap="flat">
                 <a:solidFill>
                   <a:srgbClr val="000000"/>
                 </a:solidFill>
@@ -8960,7 +8962,7 @@
             </a:ln>
             <a:extLst>
               <a:ext uri="{91240B29-F687-4f45-9708-019B960494DF}">
-                <a14:hiddenLine xmlns:a14="http://schemas.microsoft.com/office/drawing/2010/main" xmlns="" w="25400">
+                <a14:hiddenLine xmlns="" xmlns:a14="http://schemas.microsoft.com/office/drawing/2010/main" w="25400">
                   <a:solidFill>
                     <a:schemeClr val="tx1"/>
                   </a:solidFill>
@@ -9018,14 +9020,14 @@
             </a:ln>
             <a:extLst>
               <a:ext uri="{909E8E84-426E-40dd-AFC4-6F175D3DCCD1}">
-                <a14:hiddenFill xmlns:a14="http://schemas.microsoft.com/office/drawing/2010/main" xmlns="">
+                <a14:hiddenFill xmlns="" xmlns:a14="http://schemas.microsoft.com/office/drawing/2010/main">
                   <a:solidFill>
                     <a:srgbClr val="FFFFFF"/>
                   </a:solidFill>
                 </a14:hiddenFill>
               </a:ext>
               <a:ext uri="{91240B29-F687-4f45-9708-019B960494DF}">
-                <a14:hiddenLine xmlns:a14="http://schemas.microsoft.com/office/drawing/2010/main" xmlns="" w="9525">
+                <a14:hiddenLine xmlns="" xmlns:a14="http://schemas.microsoft.com/office/drawing/2010/main" w="9525">
                   <a:solidFill>
                     <a:srgbClr val="000000"/>
                   </a:solidFill>
@@ -9604,14 +9606,14 @@
           </a:ln>
           <a:extLst>
             <a:ext uri="{909E8E84-426E-40dd-AFC4-6F175D3DCCD1}">
-              <a14:hiddenFill xmlns:a14="http://schemas.microsoft.com/office/drawing/2010/main" xmlns="">
+              <a14:hiddenFill xmlns="" xmlns:a14="http://schemas.microsoft.com/office/drawing/2010/main">
                 <a:solidFill>
                   <a:srgbClr val="FFFFFF"/>
                 </a:solidFill>
               </a14:hiddenFill>
             </a:ext>
             <a:ext uri="{91240B29-F687-4f45-9708-019B960494DF}">
-              <a14:hiddenLine xmlns:a14="http://schemas.microsoft.com/office/drawing/2010/main" xmlns="" w="9525">
+              <a14:hiddenLine xmlns="" xmlns:a14="http://schemas.microsoft.com/office/drawing/2010/main" w="9525">
                 <a:solidFill>
                   <a:srgbClr val="000000"/>
                 </a:solidFill>
@@ -9720,7 +9722,7 @@
             </a:ln>
             <a:extLst>
               <a:ext uri="{91240B29-F687-4f45-9708-019B960494DF}">
-                <a14:hiddenLine xmlns:a14="http://schemas.microsoft.com/office/drawing/2010/main" xmlns="" w="25400">
+                <a14:hiddenLine xmlns="" xmlns:a14="http://schemas.microsoft.com/office/drawing/2010/main" w="25400">
                   <a:solidFill>
                     <a:schemeClr val="tx1"/>
                   </a:solidFill>
@@ -9778,14 +9780,14 @@
             </a:ln>
             <a:extLst>
               <a:ext uri="{909E8E84-426E-40dd-AFC4-6F175D3DCCD1}">
-                <a14:hiddenFill xmlns:a14="http://schemas.microsoft.com/office/drawing/2010/main" xmlns="">
+                <a14:hiddenFill xmlns="" xmlns:a14="http://schemas.microsoft.com/office/drawing/2010/main">
                   <a:solidFill>
                     <a:srgbClr val="FFFFFF"/>
                   </a:solidFill>
                 </a14:hiddenFill>
               </a:ext>
               <a:ext uri="{91240B29-F687-4f45-9708-019B960494DF}">
-                <a14:hiddenLine xmlns:a14="http://schemas.microsoft.com/office/drawing/2010/main" xmlns="" w="9525">
+                <a14:hiddenLine xmlns="" xmlns:a14="http://schemas.microsoft.com/office/drawing/2010/main" w="9525">
                   <a:solidFill>
                     <a:srgbClr val="000000"/>
                   </a:solidFill>
@@ -10004,7 +10006,7 @@
             </a:ln>
             <a:extLst>
               <a:ext uri="{91240B29-F687-4f45-9708-019B960494DF}">
-                <a14:hiddenLine xmlns:a14="http://schemas.microsoft.com/office/drawing/2010/main" xmlns="" w="25400">
+                <a14:hiddenLine xmlns="" xmlns:a14="http://schemas.microsoft.com/office/drawing/2010/main" w="25400">
                   <a:solidFill>
                     <a:schemeClr val="tx1"/>
                   </a:solidFill>
@@ -10062,14 +10064,14 @@
             </a:ln>
             <a:extLst>
               <a:ext uri="{909E8E84-426E-40dd-AFC4-6F175D3DCCD1}">
-                <a14:hiddenFill xmlns:a14="http://schemas.microsoft.com/office/drawing/2010/main" xmlns="">
+                <a14:hiddenFill xmlns="" xmlns:a14="http://schemas.microsoft.com/office/drawing/2010/main">
                   <a:solidFill>
                     <a:srgbClr val="FFFFFF"/>
                   </a:solidFill>
                 </a14:hiddenFill>
               </a:ext>
               <a:ext uri="{91240B29-F687-4f45-9708-019B960494DF}">
-                <a14:hiddenLine xmlns:a14="http://schemas.microsoft.com/office/drawing/2010/main" xmlns="" w="9525">
+                <a14:hiddenLine xmlns="" xmlns:a14="http://schemas.microsoft.com/office/drawing/2010/main" w="9525">
                   <a:solidFill>
                     <a:srgbClr val="000000"/>
                   </a:solidFill>
@@ -10541,7 +10543,7 @@
             </a:ln>
             <a:extLst>
               <a:ext uri="{91240B29-F687-4f45-9708-019B960494DF}">
-                <a14:hiddenLine xmlns:a14="http://schemas.microsoft.com/office/drawing/2010/main" xmlns="" w="25400">
+                <a14:hiddenLine xmlns="" xmlns:a14="http://schemas.microsoft.com/office/drawing/2010/main" w="25400">
                   <a:solidFill>
                     <a:schemeClr val="tx1"/>
                   </a:solidFill>
@@ -10599,14 +10601,14 @@
             </a:ln>
             <a:extLst>
               <a:ext uri="{909E8E84-426E-40dd-AFC4-6F175D3DCCD1}">
-                <a14:hiddenFill xmlns:a14="http://schemas.microsoft.com/office/drawing/2010/main" xmlns="">
+                <a14:hiddenFill xmlns="" xmlns:a14="http://schemas.microsoft.com/office/drawing/2010/main">
                   <a:solidFill>
                     <a:srgbClr val="FFFFFF"/>
                   </a:solidFill>
                 </a14:hiddenFill>
               </a:ext>
               <a:ext uri="{91240B29-F687-4f45-9708-019B960494DF}">
-                <a14:hiddenLine xmlns:a14="http://schemas.microsoft.com/office/drawing/2010/main" xmlns="" w="9525">
+                <a14:hiddenLine xmlns="" xmlns:a14="http://schemas.microsoft.com/office/drawing/2010/main" w="9525">
                   <a:solidFill>
                     <a:srgbClr val="000000"/>
                   </a:solidFill>
@@ -11227,7 +11229,11 @@
           <a:p>
             <a:r>
               <a:rPr lang="en-US" dirty="0" smtClean="0"/>
-              <a:t>Pluralization Practices</a:t>
+              <a:t>Localization / Pluralization </a:t>
+            </a:r>
+            <a:r>
+              <a:rPr lang="en-US" dirty="0" smtClean="0"/>
+              <a:t>Practices</a:t>
             </a:r>
             <a:endParaRPr lang="en-US" dirty="0"/>
           </a:p>
@@ -11304,6 +11310,565 @@
       </p:grpSpPr>
       <p:sp>
         <p:nvSpPr>
+          <p:cNvPr id="2" name="Text Placeholder 1"/>
+          <p:cNvSpPr>
+            <a:spLocks noGrp="1"/>
+          </p:cNvSpPr>
+          <p:nvPr>
+            <p:ph type="body" idx="1"/>
+          </p:nvPr>
+        </p:nvSpPr>
+        <p:spPr>
+          <a:xfrm>
+            <a:off x="640080" y="1389381"/>
+            <a:ext cx="10908792" cy="436878"/>
+          </a:xfrm>
+        </p:spPr>
+        <p:txBody>
+          <a:bodyPr/>
+          <a:lstStyle/>
+          <a:p>
+            <a:pPr algn="ctr"/>
+            <a:r>
+              <a:rPr lang="en-US" dirty="0" smtClean="0"/>
+              <a:t>NUI-Intl offers a My-Get package to give localization abilities in NUI</a:t>
+            </a:r>
+            <a:endParaRPr lang="en-US" dirty="0"/>
+          </a:p>
+        </p:txBody>
+      </p:sp>
+      <p:sp>
+        <p:nvSpPr>
+          <p:cNvPr id="3" name="Content Placeholder 2"/>
+          <p:cNvSpPr>
+            <a:spLocks noGrp="1"/>
+          </p:cNvSpPr>
+          <p:nvPr>
+            <p:ph sz="half" idx="2"/>
+          </p:nvPr>
+        </p:nvSpPr>
+        <p:spPr>
+          <a:xfrm>
+            <a:off x="640080" y="1859280"/>
+            <a:ext cx="10908792" cy="4046220"/>
+          </a:xfrm>
+        </p:spPr>
+        <p:txBody>
+          <a:bodyPr/>
+          <a:lstStyle/>
+          <a:p>
+            <a:r>
+              <a:rPr lang="en-US" b="1" dirty="0" smtClean="0">
+                <a:solidFill>
+                  <a:sysClr val="windowText" lastClr="000000"/>
+                </a:solidFill>
+              </a:rPr>
+              <a:t>@concur/</a:t>
+            </a:r>
+            <a:r>
+              <a:rPr lang="en-US" b="1" dirty="0" err="1" smtClean="0">
+                <a:solidFill>
+                  <a:sysClr val="windowText" lastClr="000000"/>
+                </a:solidFill>
+              </a:rPr>
+              <a:t>nui-intl</a:t>
+            </a:r>
+            <a:r>
+              <a:rPr lang="en-US" b="1" dirty="0" smtClean="0">
+                <a:solidFill>
+                  <a:sysClr val="windowText" lastClr="000000"/>
+                </a:solidFill>
+              </a:rPr>
+              <a:t> offers a few functions that aid in l10n</a:t>
+            </a:r>
+          </a:p>
+          <a:p>
+            <a:pPr lvl="1"/>
+            <a:r>
+              <a:rPr lang="en-US" dirty="0" smtClean="0"/>
+              <a:t>Use the &lt;</a:t>
+            </a:r>
+            <a:r>
+              <a:rPr lang="en-US" dirty="0" err="1" smtClean="0"/>
+              <a:t>FormattedMessage</a:t>
+            </a:r>
+            <a:r>
+              <a:rPr lang="en-US" dirty="0" smtClean="0"/>
+              <a:t> /&gt; component</a:t>
+            </a:r>
+          </a:p>
+          <a:p>
+            <a:pPr lvl="1"/>
+            <a:r>
+              <a:rPr lang="en-US" dirty="0" smtClean="0"/>
+              <a:t>Use </a:t>
+            </a:r>
+            <a:r>
+              <a:rPr lang="en-US" dirty="0" err="1" smtClean="0"/>
+              <a:t>nuiIntl</a:t>
+            </a:r>
+            <a:r>
+              <a:rPr lang="en-US" dirty="0" smtClean="0"/>
+              <a:t> by pulling it in through </a:t>
+            </a:r>
+            <a:r>
+              <a:rPr lang="en-US" dirty="0" err="1" smtClean="0"/>
+              <a:t>contextTypes</a:t>
+            </a:r>
+            <a:r>
+              <a:rPr lang="en-US" dirty="0" smtClean="0"/>
+              <a:t> and use </a:t>
+            </a:r>
+            <a:r>
+              <a:rPr lang="en-US" dirty="0" err="1" smtClean="0"/>
+              <a:t>formattedMessage</a:t>
+            </a:r>
+            <a:r>
+              <a:rPr lang="en-US" dirty="0" smtClean="0"/>
+              <a:t>() off of the </a:t>
+            </a:r>
+            <a:r>
+              <a:rPr lang="en-US" dirty="0" err="1" smtClean="0"/>
+              <a:t>nuiIntl</a:t>
+            </a:r>
+            <a:r>
+              <a:rPr lang="en-US" dirty="0" smtClean="0"/>
+              <a:t> object</a:t>
+            </a:r>
+          </a:p>
+          <a:p>
+            <a:pPr lvl="1"/>
+            <a:r>
+              <a:rPr lang="en-US" dirty="0" smtClean="0"/>
+              <a:t>Wrap your component in </a:t>
+            </a:r>
+            <a:r>
+              <a:rPr lang="en-US" dirty="0" err="1" smtClean="0"/>
+              <a:t>withFormatter</a:t>
+            </a:r>
+            <a:r>
+              <a:rPr lang="en-US" dirty="0" smtClean="0"/>
+              <a:t>() which gives formatter as a prop to your component to be used with </a:t>
+            </a:r>
+            <a:r>
+              <a:rPr lang="en-US" dirty="0" err="1" smtClean="0"/>
+              <a:t>formatter.formattedMessage</a:t>
+            </a:r>
+            <a:r>
+              <a:rPr lang="en-US" dirty="0" smtClean="0"/>
+              <a:t>()</a:t>
+            </a:r>
+            <a:endParaRPr lang="en-US" dirty="0"/>
+          </a:p>
+        </p:txBody>
+      </p:sp>
+      <p:sp>
+        <p:nvSpPr>
+          <p:cNvPr id="4" name="Text Placeholder 3"/>
+          <p:cNvSpPr>
+            <a:spLocks noGrp="1"/>
+          </p:cNvSpPr>
+          <p:nvPr>
+            <p:ph type="body" sz="quarter" idx="3"/>
+          </p:nvPr>
+        </p:nvSpPr>
+        <p:spPr/>
+        <p:txBody>
+          <a:bodyPr/>
+          <a:lstStyle/>
+          <a:p>
+            <a:endParaRPr lang="en-US" dirty="0"/>
+          </a:p>
+        </p:txBody>
+      </p:sp>
+      <p:sp>
+        <p:nvSpPr>
+          <p:cNvPr id="5" name="Content Placeholder 4"/>
+          <p:cNvSpPr>
+            <a:spLocks noGrp="1"/>
+          </p:cNvSpPr>
+          <p:nvPr>
+            <p:ph sz="quarter" idx="4"/>
+          </p:nvPr>
+        </p:nvSpPr>
+        <p:spPr>
+          <a:xfrm>
+            <a:off x="571198" y="4475748"/>
+            <a:ext cx="10977674" cy="1429752"/>
+          </a:xfrm>
+        </p:spPr>
+        <p:txBody>
+          <a:bodyPr/>
+          <a:lstStyle/>
+          <a:p>
+            <a:r>
+              <a:rPr lang="en-US" dirty="0" smtClean="0"/>
+              <a:t>&lt;</a:t>
+            </a:r>
+            <a:r>
+              <a:rPr lang="en-US" dirty="0" err="1" smtClean="0"/>
+              <a:t>FormattedMessage</a:t>
+            </a:r>
+            <a:r>
+              <a:rPr lang="en-US" dirty="0" smtClean="0"/>
+              <a:t> id=‘hello’ /&gt;</a:t>
+            </a:r>
+          </a:p>
+          <a:p>
+            <a:r>
+              <a:rPr lang="en-US" dirty="0" err="1" smtClean="0"/>
+              <a:t>context.nuiIntl.formattedMessage</a:t>
+            </a:r>
+            <a:r>
+              <a:rPr lang="en-US" dirty="0" smtClean="0"/>
+              <a:t>({ id: ‘hello’ })</a:t>
+            </a:r>
+          </a:p>
+          <a:p>
+            <a:r>
+              <a:rPr lang="en-US" dirty="0" err="1"/>
+              <a:t>p</a:t>
+            </a:r>
+            <a:r>
+              <a:rPr lang="en-US" dirty="0" err="1" smtClean="0"/>
+              <a:t>rops.formatter.formattedMessage</a:t>
+            </a:r>
+            <a:r>
+              <a:rPr lang="en-US" dirty="0" smtClean="0"/>
+              <a:t>({ id: ‘hello’ })</a:t>
+            </a:r>
+            <a:endParaRPr lang="en-US" dirty="0"/>
+          </a:p>
+        </p:txBody>
+      </p:sp>
+      <p:sp>
+        <p:nvSpPr>
+          <p:cNvPr id="6" name="Title 5"/>
+          <p:cNvSpPr>
+            <a:spLocks noGrp="1"/>
+          </p:cNvSpPr>
+          <p:nvPr>
+            <p:ph type="title"/>
+          </p:nvPr>
+        </p:nvSpPr>
+        <p:spPr>
+          <a:xfrm>
+            <a:off x="571198" y="431760"/>
+            <a:ext cx="10908792" cy="615553"/>
+          </a:xfrm>
+        </p:spPr>
+        <p:txBody>
+          <a:bodyPr/>
+          <a:lstStyle/>
+          <a:p>
+            <a:pPr algn="ctr"/>
+            <a:r>
+              <a:rPr lang="en-US" dirty="0" smtClean="0"/>
+              <a:t>L10n in the NUI world</a:t>
+            </a:r>
+            <a:endParaRPr lang="en-US" dirty="0"/>
+          </a:p>
+        </p:txBody>
+      </p:sp>
+    </p:spTree>
+    <p:extLst>
+      <p:ext uri="{BB962C8B-B14F-4D97-AF65-F5344CB8AC3E}">
+        <p14:creationId xmlns:p14="http://schemas.microsoft.com/office/powerpoint/2010/main" val="1424729069"/>
+      </p:ext>
+    </p:extLst>
+  </p:cSld>
+  <p:clrMapOvr>
+    <a:masterClrMapping/>
+  </p:clrMapOvr>
+  <p:transition>
+    <p:fade/>
+  </p:transition>
+  <p:timing>
+    <p:tnLst>
+      <p:par>
+        <p:cTn id="1" dur="indefinite" restart="never" nodeType="tmRoot"/>
+      </p:par>
+    </p:tnLst>
+  </p:timing>
+</p:sld>
+</file>
+
+<file path=ppt/slides/slide3.xml><?xml version="1.0" encoding="utf-8"?>
+<p:sld xmlns:a="http://schemas.openxmlformats.org/drawingml/2006/main" xmlns:r="http://schemas.openxmlformats.org/officeDocument/2006/relationships" xmlns:p="http://schemas.openxmlformats.org/presentationml/2006/main">
+  <p:cSld>
+    <p:spTree>
+      <p:nvGrpSpPr>
+        <p:cNvPr id="1" name=""/>
+        <p:cNvGrpSpPr/>
+        <p:nvPr/>
+      </p:nvGrpSpPr>
+      <p:grpSpPr>
+        <a:xfrm>
+          <a:off x="0" y="0"/>
+          <a:ext cx="0" cy="0"/>
+          <a:chOff x="0" y="0"/>
+          <a:chExt cx="0" cy="0"/>
+        </a:xfrm>
+      </p:grpSpPr>
+      <p:sp>
+        <p:nvSpPr>
+          <p:cNvPr id="2" name="Text Placeholder 1"/>
+          <p:cNvSpPr>
+            <a:spLocks noGrp="1"/>
+          </p:cNvSpPr>
+          <p:nvPr>
+            <p:ph type="body" idx="1"/>
+          </p:nvPr>
+        </p:nvSpPr>
+        <p:spPr/>
+        <p:txBody>
+          <a:bodyPr/>
+          <a:lstStyle/>
+          <a:p>
+            <a:endParaRPr lang="en-US"/>
+          </a:p>
+        </p:txBody>
+      </p:sp>
+      <p:sp>
+        <p:nvSpPr>
+          <p:cNvPr id="3" name="Content Placeholder 2"/>
+          <p:cNvSpPr>
+            <a:spLocks noGrp="1"/>
+          </p:cNvSpPr>
+          <p:nvPr>
+            <p:ph sz="half" idx="2"/>
+          </p:nvPr>
+        </p:nvSpPr>
+        <p:spPr>
+          <a:xfrm>
+            <a:off x="640080" y="1859280"/>
+            <a:ext cx="10908792" cy="4046220"/>
+          </a:xfrm>
+        </p:spPr>
+        <p:txBody>
+          <a:bodyPr/>
+          <a:lstStyle/>
+          <a:p>
+            <a:r>
+              <a:rPr lang="en-US" dirty="0"/>
+              <a:t>For local development, have a translations folder with an </a:t>
+            </a:r>
+            <a:r>
+              <a:rPr lang="en-US" dirty="0" err="1"/>
+              <a:t>en.js</a:t>
+            </a:r>
+            <a:r>
+              <a:rPr lang="en-US" dirty="0"/>
+              <a:t> file to add your messages in an {id: message} </a:t>
+            </a:r>
+            <a:r>
+              <a:rPr lang="en-US" dirty="0" smtClean="0"/>
+              <a:t>format</a:t>
+            </a:r>
+          </a:p>
+          <a:p>
+            <a:pPr lvl="1"/>
+            <a:r>
+              <a:rPr lang="en-US" dirty="0" err="1"/>
+              <a:t>c</a:t>
+            </a:r>
+            <a:r>
+              <a:rPr lang="en-US" dirty="0" err="1" smtClean="0"/>
+              <a:t>onst</a:t>
+            </a:r>
+            <a:r>
+              <a:rPr lang="en-US" dirty="0" smtClean="0"/>
+              <a:t> messages = { hello: ‘Hello React World’ }</a:t>
+            </a:r>
+          </a:p>
+          <a:p>
+            <a:pPr lvl="1"/>
+            <a:endParaRPr lang="en-US" dirty="0" smtClean="0"/>
+          </a:p>
+          <a:p>
+            <a:r>
+              <a:rPr lang="en-US" dirty="0" smtClean="0"/>
+              <a:t>Add messages to an xml file in the legacy stack with a NUI = TRUE flag so that your messages get localized</a:t>
+            </a:r>
+          </a:p>
+          <a:p>
+            <a:pPr lvl="1"/>
+            <a:r>
+              <a:rPr lang="en-US" dirty="0" smtClean="0"/>
+              <a:t>&lt;</a:t>
+            </a:r>
+            <a:r>
+              <a:rPr lang="en-US" dirty="0" err="1" smtClean="0"/>
+              <a:t>UserMessage</a:t>
+            </a:r>
+            <a:r>
+              <a:rPr lang="en-US" dirty="0" smtClean="0"/>
+              <a:t> </a:t>
+            </a:r>
+            <a:r>
+              <a:rPr lang="en-US" dirty="0" err="1" smtClean="0"/>
+              <a:t>nui</a:t>
+            </a:r>
+            <a:r>
+              <a:rPr lang="en-US" dirty="0" smtClean="0"/>
+              <a:t>=“true” ID=“Hello”&gt;Hello React World&lt;/</a:t>
+            </a:r>
+            <a:r>
+              <a:rPr lang="en-US" dirty="0" err="1" smtClean="0"/>
+              <a:t>UserMessage</a:t>
+            </a:r>
+            <a:r>
+              <a:rPr lang="en-US" dirty="0" smtClean="0"/>
+              <a:t>&gt;</a:t>
+            </a:r>
+            <a:endParaRPr lang="en-US" dirty="0"/>
+          </a:p>
+          <a:p>
+            <a:endParaRPr lang="en-US" dirty="0"/>
+          </a:p>
+        </p:txBody>
+      </p:sp>
+      <p:sp>
+        <p:nvSpPr>
+          <p:cNvPr id="4" name="Text Placeholder 3"/>
+          <p:cNvSpPr>
+            <a:spLocks noGrp="1"/>
+          </p:cNvSpPr>
+          <p:nvPr>
+            <p:ph type="body" sz="quarter" idx="3"/>
+          </p:nvPr>
+        </p:nvSpPr>
+        <p:spPr/>
+        <p:txBody>
+          <a:bodyPr/>
+          <a:lstStyle/>
+          <a:p>
+            <a:endParaRPr lang="en-US"/>
+          </a:p>
+        </p:txBody>
+      </p:sp>
+      <p:sp>
+        <p:nvSpPr>
+          <p:cNvPr id="5" name="Content Placeholder 4"/>
+          <p:cNvSpPr>
+            <a:spLocks noGrp="1"/>
+          </p:cNvSpPr>
+          <p:nvPr>
+            <p:ph sz="quarter" idx="4"/>
+          </p:nvPr>
+        </p:nvSpPr>
+        <p:spPr/>
+        <p:txBody>
+          <a:bodyPr/>
+          <a:lstStyle/>
+          <a:p>
+            <a:pPr marL="0" marR="0" lvl="0" indent="0" defTabSz="914400" eaLnBrk="1" fontAlgn="auto" latinLnBrk="0" hangingPunct="1">
+              <a:lnSpc>
+                <a:spcPct val="100000"/>
+              </a:lnSpc>
+              <a:spcBef>
+                <a:spcPts val="0"/>
+              </a:spcBef>
+              <a:spcAft>
+                <a:spcPts val="0"/>
+              </a:spcAft>
+              <a:buClrTx/>
+              <a:buSzTx/>
+              <a:buFontTx/>
+              <a:buNone/>
+              <a:tabLst/>
+              <a:defRPr/>
+            </a:pPr>
+            <a:endParaRPr lang="en-US" dirty="0" smtClean="0"/>
+          </a:p>
+          <a:p>
+            <a:pPr marL="0" marR="0" lvl="0" indent="0" defTabSz="914400" eaLnBrk="1" fontAlgn="auto" latinLnBrk="0" hangingPunct="1">
+              <a:lnSpc>
+                <a:spcPct val="100000"/>
+              </a:lnSpc>
+              <a:spcBef>
+                <a:spcPts val="0"/>
+              </a:spcBef>
+              <a:spcAft>
+                <a:spcPts val="0"/>
+              </a:spcAft>
+              <a:buClrTx/>
+              <a:buSzTx/>
+              <a:buFontTx/>
+              <a:buNone/>
+              <a:tabLst/>
+              <a:defRPr/>
+            </a:pPr>
+            <a:endParaRPr lang="en-US" dirty="0"/>
+          </a:p>
+        </p:txBody>
+      </p:sp>
+      <p:sp>
+        <p:nvSpPr>
+          <p:cNvPr id="6" name="Title 5"/>
+          <p:cNvSpPr>
+            <a:spLocks noGrp="1"/>
+          </p:cNvSpPr>
+          <p:nvPr>
+            <p:ph type="title"/>
+          </p:nvPr>
+        </p:nvSpPr>
+        <p:spPr/>
+        <p:txBody>
+          <a:bodyPr/>
+          <a:lstStyle/>
+          <a:p>
+            <a:pPr algn="ctr"/>
+            <a:r>
+              <a:rPr lang="en-US" dirty="0" smtClean="0"/>
+              <a:t>Formatted Messages</a:t>
+            </a:r>
+            <a:endParaRPr lang="en-US" dirty="0"/>
+          </a:p>
+        </p:txBody>
+      </p:sp>
+    </p:spTree>
+    <p:extLst>
+      <p:ext uri="{BB962C8B-B14F-4D97-AF65-F5344CB8AC3E}">
+        <p14:creationId xmlns:p14="http://schemas.microsoft.com/office/powerpoint/2010/main" val="1243347960"/>
+      </p:ext>
+    </p:extLst>
+  </p:cSld>
+  <p:clrMapOvr>
+    <a:masterClrMapping/>
+  </p:clrMapOvr>
+  <p:transition>
+    <p:fade/>
+  </p:transition>
+  <p:timing>
+    <p:tnLst>
+      <p:par>
+        <p:cTn id="1" dur="indefinite" restart="never" nodeType="tmRoot"/>
+      </p:par>
+    </p:tnLst>
+  </p:timing>
+</p:sld>
+</file>
+
+<file path=ppt/slides/slide4.xml><?xml version="1.0" encoding="utf-8"?>
+<p:sld xmlns:a="http://schemas.openxmlformats.org/drawingml/2006/main" xmlns:r="http://schemas.openxmlformats.org/officeDocument/2006/relationships" xmlns:p="http://schemas.openxmlformats.org/presentationml/2006/main">
+  <p:cSld>
+    <p:spTree>
+      <p:nvGrpSpPr>
+        <p:cNvPr id="1" name=""/>
+        <p:cNvGrpSpPr/>
+        <p:nvPr/>
+      </p:nvGrpSpPr>
+      <p:grpSpPr>
+        <a:xfrm>
+          <a:off x="0" y="0"/>
+          <a:ext cx="0" cy="0"/>
+          <a:chOff x="0" y="0"/>
+          <a:chExt cx="0" cy="0"/>
+        </a:xfrm>
+      </p:grpSpPr>
+      <p:sp>
+        <p:nvSpPr>
           <p:cNvPr id="5" name="Text Placeholder 4"/>
           <p:cNvSpPr>
             <a:spLocks noGrp="1"/>
@@ -11325,20 +11890,27 @@
             <a:pPr algn="ctr"/>
             <a:r>
               <a:rPr lang="en-US" dirty="0"/>
-              <a:t>It has to do with grammar rules for some languages. The gender of a preceding number determine the word ending of the following noun.</a:t>
+              <a:t>It has to do with grammar rules for some languages. The gender of a preceding number </a:t>
+            </a:r>
+            <a:r>
+              <a:rPr lang="en-US" dirty="0" smtClean="0"/>
+              <a:t>can </a:t>
+            </a:r>
+            <a:r>
+              <a:rPr lang="en-US" dirty="0" smtClean="0"/>
+              <a:t>determine </a:t>
+            </a:r>
+            <a:r>
+              <a:rPr lang="en-US" dirty="0"/>
+              <a:t>the word ending of the following noun.</a:t>
             </a:r>
           </a:p>
           <a:p>
             <a:pPr algn="ctr"/>
             <a:r>
               <a:rPr lang="en-US" dirty="0"/>
-              <a:t>It only takes a small addition to include code that will respect grammar rules. </a:t>
-            </a:r>
-            <a:r>
-              <a:rPr lang="en-US"/>
-              <a:t>This greatly improves the user experience for certain languages.</a:t>
-            </a:r>
-            <a:endParaRPr lang="en-US" dirty="0"/>
+              <a:t>It only takes a small addition to include code that will respect grammar rules. This greatly improves the user experience for certain languages.</a:t>
+            </a:r>
           </a:p>
         </p:txBody>
       </p:sp>
@@ -11362,12 +11934,13 @@
           <a:bodyPr/>
           <a:lstStyle/>
           <a:p>
-            <a:r>
-              <a:rPr lang="en-US" dirty="0" smtClean="0"/>
+            <a:endParaRPr lang="en-US" smtClean="0"/>
+          </a:p>
+          <a:p>
+            <a:r>
+              <a:rPr lang="en-US" smtClean="0"/>
               <a:t>Example</a:t>
             </a:r>
-          </a:p>
-          <a:p>
             <a:endParaRPr lang="en-US" dirty="0" smtClean="0"/>
           </a:p>
           <a:p>
@@ -11538,7 +12111,7 @@
 </p:sld>
 </file>
 
-<file path=ppt/slides/slide3.xml><?xml version="1.0" encoding="utf-8"?>
+<file path=ppt/slides/slide5.xml><?xml version="1.0" encoding="utf-8"?>
 <p:sld xmlns:a="http://schemas.openxmlformats.org/drawingml/2006/main" xmlns:r="http://schemas.openxmlformats.org/officeDocument/2006/relationships" xmlns:p="http://schemas.openxmlformats.org/presentationml/2006/main">
   <p:cSld>
     <p:spTree>
@@ -11765,14 +12338,13 @@
           <a:p>
             <a:r>
               <a:rPr lang="en-US" dirty="0"/>
-              <a:t>Adding ‘2 stops’, instead of going straight to ‘2 plus stops’ helps that message to follow grammar rules and is only an additional 4 lines of code.</a:t>
-            </a:r>
-          </a:p>
-          <a:p>
-            <a:r>
-              <a:rPr lang="en-US" dirty="0"/>
-              <a:t>3 or more stops isn’t a common value in this example, so stopping at 2 stops is reasonable here.</a:t>
-            </a:r>
+              <a:t>Adding ‘2 stops’, instead of going straight to ‘2 plus stops’ helps that message to follow grammar rules and is only an additional 4 lines of code</a:t>
+            </a:r>
+            <a:r>
+              <a:rPr lang="en-US" dirty="0" smtClean="0"/>
+              <a:t>.</a:t>
+            </a:r>
+            <a:endParaRPr lang="en-US" dirty="0"/>
           </a:p>
         </p:txBody>
       </p:sp>
@@ -11799,7 +12371,7 @@
 </p:sld>
 </file>
 
-<file path=ppt/slides/slide4.xml><?xml version="1.0" encoding="utf-8"?>
+<file path=ppt/slides/slide6.xml><?xml version="1.0" encoding="utf-8"?>
 <p:sld xmlns:a="http://schemas.openxmlformats.org/drawingml/2006/main" xmlns:r="http://schemas.openxmlformats.org/officeDocument/2006/relationships" xmlns:p="http://schemas.openxmlformats.org/presentationml/2006/main">
   <p:cSld>
     <p:spTree>

</xml_diff>